<commit_message>
Upload sixth week slide
</commit_message>
<xml_diff>
--- a/week1/week1-lecture.pptx
+++ b/week1/week1-lecture.pptx
@@ -20855,7 +20855,39 @@
               <a:rPr lang="en-US" dirty="0">
                 <a:latin typeface="Garamond" panose="02020404030301010803" pitchFamily="18" charset="0"/>
               </a:rPr>
-              <a:t>Suggested by Arthur</a:t>
+              <a:t>Suggested by Arthur 2024</a:t>
+            </a:r>
+            <a:br>
+              <a:rPr lang="en-US" dirty="0">
+                <a:latin typeface="Garamond" panose="02020404030301010803" pitchFamily="18" charset="0"/>
+              </a:rPr>
+            </a:br>
+            <a:br>
+              <a:rPr lang="en-US" dirty="0">
+                <a:latin typeface="Garamond" panose="02020404030301010803" pitchFamily="18" charset="0"/>
+              </a:rPr>
+            </a:br>
+            <a:br>
+              <a:rPr lang="en-US" dirty="0">
+                <a:latin typeface="Garamond" panose="02020404030301010803" pitchFamily="18" charset="0"/>
+              </a:rPr>
+            </a:br>
+            <a:r>
+              <a:rPr lang="en-US" dirty="0">
+                <a:latin typeface="Garamond" panose="02020404030301010803" pitchFamily="18" charset="0"/>
+              </a:rPr>
+              <a:t>Name this for 2025, comment </a:t>
+            </a:r>
+            <a:br>
+              <a:rPr lang="en-US" dirty="0">
+                <a:latin typeface="Garamond" panose="02020404030301010803" pitchFamily="18" charset="0"/>
+              </a:rPr>
+            </a:br>
+            <a:r>
+              <a:rPr lang="en-US" dirty="0">
+                <a:latin typeface="Garamond" panose="02020404030301010803" pitchFamily="18" charset="0"/>
+              </a:rPr>
+              <a:t>in Introduction forum post.</a:t>
             </a:r>
             <a:endParaRPr dirty="0">
               <a:latin typeface="Garamond" panose="02020404030301010803" pitchFamily="18" charset="0"/>
@@ -20959,7 +20991,7 @@
               <a:buNone/>
             </a:pPr>
             <a:r>
-              <a:rPr lang="en" sz="1550">
+              <a:rPr lang="en" sz="1550" dirty="0">
                 <a:solidFill>
                   <a:schemeClr val="lt2"/>
                 </a:solidFill>
@@ -20973,7 +21005,7 @@
               </a:rPr>
               <a:t>There are two hard things in computer science: cache invalidation, naming things, and off-by-one errors.</a:t>
             </a:r>
-            <a:endParaRPr sz="1200">
+            <a:endParaRPr sz="1200" dirty="0">
               <a:solidFill>
                 <a:schemeClr val="lt2"/>
               </a:solidFill>

</xml_diff>